<commit_message>
Implemented List and Picture Slide generator
</commit_message>
<xml_diff>
--- a/Task1_PPTX_report/example_output.pptx
+++ b/Task1_PPTX_report/example_output.pptx
@@ -5,11 +5,11 @@
     <p:sldMasterId id="2147483648" r:id="rId1"/>
   </p:sldMasterIdLst>
   <p:sldIdLst>
-    <p:sldId id="256" r:id="rId7"/>
-    <p:sldId id="257" r:id="rId8"/>
-    <p:sldId id="258" r:id="rId9"/>
-    <p:sldId id="259" r:id="rId10"/>
-    <p:sldId id="260" r:id="rId11"/>
+    <p:sldId id="256" r:id="rId2"/>
+    <p:sldId id="257" r:id="rId3"/>
+    <p:sldId id="258" r:id="rId4"/>
+    <p:sldId id="259" r:id="rId5"/>
+    <p:sldId id="260" r:id="rId6"/>
   </p:sldIdLst>
   <p:sldSz cx="9144000" cy="6858000" type="screen4x3"/>
   <p:notesSz cx="6858000" cy="9144000"/>
@@ -108,6 +108,22 @@
       </a:defRPr>
     </a:lvl9pPr>
   </p:defaultTextStyle>
+  <p:extLst>
+    <p:ext uri="{EFAFB233-063F-42B5-8137-9DF3F51BA10A}">
+      <p15:sldGuideLst xmlns:p15="http://schemas.microsoft.com/office/powerpoint/2012/main">
+        <p15:guide id="1" orient="horz" pos="2160">
+          <p15:clr>
+            <a:srgbClr val="A4A3A4"/>
+          </p15:clr>
+        </p15:guide>
+        <p15:guide id="2" pos="2880">
+          <p15:clr>
+            <a:srgbClr val="A4A3A4"/>
+          </p15:clr>
+        </p15:guide>
+      </p15:sldGuideLst>
+    </p:ext>
+  </p:extLst>
 </p:presentation>
 </file>
 
@@ -292,7 +308,7 @@
           <a:p>
             <a:fld id="{5BCAD085-E8A6-8845-BD4E-CB4CCA059FC4}" type="datetimeFigureOut">
               <a:rPr lang="en-US" smtClean="0"/>
-              <a:t>1/27/13</a:t>
+              <a:t>7/14/2023</a:t>
             </a:fld>
             <a:endParaRPr lang="en-US"/>
           </a:p>
@@ -462,7 +478,7 @@
           <a:p>
             <a:fld id="{5BCAD085-E8A6-8845-BD4E-CB4CCA059FC4}" type="datetimeFigureOut">
               <a:rPr lang="en-US" smtClean="0"/>
-              <a:t>1/27/13</a:t>
+              <a:t>7/14/2023</a:t>
             </a:fld>
             <a:endParaRPr lang="en-US"/>
           </a:p>
@@ -642,7 +658,7 @@
           <a:p>
             <a:fld id="{5BCAD085-E8A6-8845-BD4E-CB4CCA059FC4}" type="datetimeFigureOut">
               <a:rPr lang="en-US" smtClean="0"/>
-              <a:t>1/27/13</a:t>
+              <a:t>7/14/2023</a:t>
             </a:fld>
             <a:endParaRPr lang="en-US"/>
           </a:p>
@@ -812,7 +828,7 @@
           <a:p>
             <a:fld id="{5BCAD085-E8A6-8845-BD4E-CB4CCA059FC4}" type="datetimeFigureOut">
               <a:rPr lang="en-US" smtClean="0"/>
-              <a:t>1/27/13</a:t>
+              <a:t>7/14/2023</a:t>
             </a:fld>
             <a:endParaRPr lang="en-US"/>
           </a:p>
@@ -1058,7 +1074,7 @@
           <a:p>
             <a:fld id="{5BCAD085-E8A6-8845-BD4E-CB4CCA059FC4}" type="datetimeFigureOut">
               <a:rPr lang="en-US" smtClean="0"/>
-              <a:t>1/27/13</a:t>
+              <a:t>7/14/2023</a:t>
             </a:fld>
             <a:endParaRPr lang="en-US"/>
           </a:p>
@@ -1346,7 +1362,7 @@
           <a:p>
             <a:fld id="{5BCAD085-E8A6-8845-BD4E-CB4CCA059FC4}" type="datetimeFigureOut">
               <a:rPr lang="en-US" smtClean="0"/>
-              <a:t>1/27/13</a:t>
+              <a:t>7/14/2023</a:t>
             </a:fld>
             <a:endParaRPr lang="en-US"/>
           </a:p>
@@ -1768,7 +1784,7 @@
           <a:p>
             <a:fld id="{5BCAD085-E8A6-8845-BD4E-CB4CCA059FC4}" type="datetimeFigureOut">
               <a:rPr lang="en-US" smtClean="0"/>
-              <a:t>1/27/13</a:t>
+              <a:t>7/14/2023</a:t>
             </a:fld>
             <a:endParaRPr lang="en-US"/>
           </a:p>
@@ -1886,7 +1902,7 @@
           <a:p>
             <a:fld id="{5BCAD085-E8A6-8845-BD4E-CB4CCA059FC4}" type="datetimeFigureOut">
               <a:rPr lang="en-US" smtClean="0"/>
-              <a:t>1/27/13</a:t>
+              <a:t>7/14/2023</a:t>
             </a:fld>
             <a:endParaRPr lang="en-US"/>
           </a:p>
@@ -1981,7 +1997,7 @@
           <a:p>
             <a:fld id="{5BCAD085-E8A6-8845-BD4E-CB4CCA059FC4}" type="datetimeFigureOut">
               <a:rPr lang="en-US" smtClean="0"/>
-              <a:t>1/27/13</a:t>
+              <a:t>7/14/2023</a:t>
             </a:fld>
             <a:endParaRPr lang="en-US"/>
           </a:p>
@@ -2258,7 +2274,7 @@
           <a:p>
             <a:fld id="{5BCAD085-E8A6-8845-BD4E-CB4CCA059FC4}" type="datetimeFigureOut">
               <a:rPr lang="en-US" smtClean="0"/>
-              <a:t>1/27/13</a:t>
+              <a:t>7/14/2023</a:t>
             </a:fld>
             <a:endParaRPr lang="en-US"/>
           </a:p>
@@ -2511,7 +2527,7 @@
           <a:p>
             <a:fld id="{5BCAD085-E8A6-8845-BD4E-CB4CCA059FC4}" type="datetimeFigureOut">
               <a:rPr lang="en-US" smtClean="0"/>
-              <a:t>1/27/13</a:t>
+              <a:t>7/14/2023</a:t>
             </a:fld>
             <a:endParaRPr lang="en-US"/>
           </a:p>
@@ -2724,7 +2740,7 @@
           <a:p>
             <a:fld id="{5BCAD085-E8A6-8845-BD4E-CB4CCA059FC4}" type="datetimeFigureOut">
               <a:rPr lang="en-US" smtClean="0"/>
-              <a:t>1/27/13</a:t>
+              <a:t>7/14/2023</a:t>
             </a:fld>
             <a:endParaRPr lang="en-US"/>
           </a:p>
@@ -3083,7 +3099,7 @@
 </file>
 
 <file path=ppt/slides/slide1.xml><?xml version="1.0" encoding="utf-8"?>
-<p:sld xmlns:a="http://schemas.openxmlformats.org/drawingml/2006/main" xmlns:p="http://schemas.openxmlformats.org/presentationml/2006/main" xmlns:r="http://schemas.openxmlformats.org/officeDocument/2006/relationships">
+<p:sld xmlns:a="http://schemas.openxmlformats.org/drawingml/2006/main" xmlns:r="http://schemas.openxmlformats.org/officeDocument/2006/relationships" xmlns:p="http://schemas.openxmlformats.org/presentationml/2006/main">
   <p:cSld>
     <p:spTree>
       <p:nvGrpSpPr>
@@ -3091,7 +3107,14 @@
         <p:cNvGrpSpPr/>
         <p:nvPr/>
       </p:nvGrpSpPr>
-      <p:grpSpPr/>
+      <p:grpSpPr>
+        <a:xfrm>
+          <a:off x="0" y="0"/>
+          <a:ext cx="0" cy="0"/>
+          <a:chOff x="0" y="0"/>
+          <a:chExt cx="0" cy="0"/>
+        </a:xfrm>
+      </p:grpSpPr>
       <p:sp>
         <p:nvSpPr>
           <p:cNvPr id="2" name="Title 1"/>
@@ -3143,7 +3166,7 @@
 </file>
 
 <file path=ppt/slides/slide2.xml><?xml version="1.0" encoding="utf-8"?>
-<p:sld xmlns:a="http://schemas.openxmlformats.org/drawingml/2006/main" xmlns:p="http://schemas.openxmlformats.org/presentationml/2006/main" xmlns:r="http://schemas.openxmlformats.org/officeDocument/2006/relationships">
+<p:sld xmlns:a="http://schemas.openxmlformats.org/drawingml/2006/main" xmlns:r="http://schemas.openxmlformats.org/officeDocument/2006/relationships" xmlns:p="http://schemas.openxmlformats.org/presentationml/2006/main">
   <p:cSld>
     <p:spTree>
       <p:nvGrpSpPr>
@@ -3151,7 +3174,14 @@
         <p:cNvGrpSpPr/>
         <p:nvPr/>
       </p:nvGrpSpPr>
-      <p:grpSpPr/>
+      <p:grpSpPr>
+        <a:xfrm>
+          <a:off x="0" y="0"/>
+          <a:ext cx="0" cy="0"/>
+          <a:chOff x="0" y="0"/>
+          <a:chExt cx="0" cy="0"/>
+        </a:xfrm>
+      </p:grpSpPr>
       <p:sp>
         <p:nvSpPr>
           <p:cNvPr id="2" name="Title 1"/>
@@ -3210,7 +3240,7 @@
 </file>
 
 <file path=ppt/slides/slide3.xml><?xml version="1.0" encoding="utf-8"?>
-<p:sld xmlns:a="http://schemas.openxmlformats.org/drawingml/2006/main" xmlns:p="http://schemas.openxmlformats.org/presentationml/2006/main" xmlns:r="http://schemas.openxmlformats.org/officeDocument/2006/relationships">
+<p:sld xmlns:a="http://schemas.openxmlformats.org/drawingml/2006/main" xmlns:r="http://schemas.openxmlformats.org/officeDocument/2006/relationships" xmlns:p="http://schemas.openxmlformats.org/presentationml/2006/main">
   <p:cSld>
     <p:spTree>
       <p:nvGrpSpPr>
@@ -3218,7 +3248,14 @@
         <p:cNvGrpSpPr/>
         <p:nvPr/>
       </p:nvGrpSpPr>
-      <p:grpSpPr/>
+      <p:grpSpPr>
+        <a:xfrm>
+          <a:off x="0" y="0"/>
+          <a:ext cx="0" cy="0"/>
+          <a:chOff x="0" y="0"/>
+          <a:chExt cx="0" cy="0"/>
+        </a:xfrm>
+      </p:grpSpPr>
       <p:sp>
         <p:nvSpPr>
           <p:cNvPr id="2" name="Title 1"/>
@@ -3254,7 +3291,9 @@
         <p:txBody>
           <a:bodyPr/>
           <a:lstStyle/>
-          <a:p/>
+          <a:p>
+            <a:endParaRPr/>
+          </a:p>
           <a:p>
             <a:pPr lvl="1"/>
             <a:r>
@@ -3290,7 +3329,7 @@
 </file>
 
 <file path=ppt/slides/slide4.xml><?xml version="1.0" encoding="utf-8"?>
-<p:sld xmlns:a="http://schemas.openxmlformats.org/drawingml/2006/main" xmlns:p="http://schemas.openxmlformats.org/presentationml/2006/main" xmlns:r="http://schemas.openxmlformats.org/officeDocument/2006/relationships">
+<p:sld xmlns:a="http://schemas.openxmlformats.org/drawingml/2006/main" xmlns:r="http://schemas.openxmlformats.org/officeDocument/2006/relationships" xmlns:p="http://schemas.openxmlformats.org/presentationml/2006/main">
   <p:cSld>
     <p:spTree>
       <p:nvGrpSpPr>
@@ -3298,7 +3337,14 @@
         <p:cNvGrpSpPr/>
         <p:nvPr/>
       </p:nvGrpSpPr>
-      <p:grpSpPr/>
+      <p:grpSpPr>
+        <a:xfrm>
+          <a:off x="0" y="0"/>
+          <a:ext cx="0" cy="0"/>
+          <a:chOff x="0" y="0"/>
+          <a:chExt cx="0" cy="0"/>
+        </a:xfrm>
+      </p:grpSpPr>
       <p:sp>
         <p:nvSpPr>
           <p:cNvPr id="2" name="Title 1"/>
@@ -3353,7 +3399,7 @@
 </file>
 
 <file path=ppt/slides/slide5.xml><?xml version="1.0" encoding="utf-8"?>
-<p:sld xmlns:a="http://schemas.openxmlformats.org/drawingml/2006/main" xmlns:p="http://schemas.openxmlformats.org/presentationml/2006/main" xmlns:r="http://schemas.openxmlformats.org/officeDocument/2006/relationships">
+<p:sld xmlns:a="http://schemas.openxmlformats.org/drawingml/2006/main" xmlns:r="http://schemas.openxmlformats.org/officeDocument/2006/relationships" xmlns:p="http://schemas.openxmlformats.org/presentationml/2006/main">
   <p:cSld>
     <p:spTree>
       <p:nvGrpSpPr>
@@ -3361,7 +3407,14 @@
         <p:cNvGrpSpPr/>
         <p:nvPr/>
       </p:nvGrpSpPr>
-      <p:grpSpPr/>
+      <p:grpSpPr>
+        <a:xfrm>
+          <a:off x="0" y="0"/>
+          <a:ext cx="0" cy="0"/>
+          <a:chOff x="0" y="0"/>
+          <a:chExt cx="0" cy="0"/>
+        </a:xfrm>
+      </p:grpSpPr>
       <p:sp>
         <p:nvSpPr>
           <p:cNvPr id="2" name="Title 1"/>

</xml_diff>